<commit_message>
Preliminary version (mind the CRLF)
</commit_message>
<xml_diff>
--- a/deprecated files/stimuli/stimuli.pptx
+++ b/deprecated files/stimuli/stimuli.pptx
@@ -15,6 +15,9 @@
     <p:sldId id="263" r:id="rId9"/>
     <p:sldId id="264" r:id="rId10"/>
     <p:sldId id="265" r:id="rId11"/>
+    <p:sldId id="266" r:id="rId12"/>
+    <p:sldId id="271" r:id="rId13"/>
+    <p:sldId id="270" r:id="rId14"/>
   </p:sldIdLst>
   <p:sldSz cx="12192000" cy="6858000"/>
   <p:notesSz cx="6858000" cy="9144000"/>
@@ -270,7 +273,7 @@
           <a:p>
             <a:fld id="{F5097797-44DE-48E0-BA19-F0A899A2AD84}" type="datetimeFigureOut">
               <a:rPr lang="en-GB" smtClean="0"/>
-              <a:t>07/10/2020</a:t>
+              <a:t>31/01/2022</a:t>
             </a:fld>
             <a:endParaRPr lang="en-GB"/>
           </a:p>
@@ -470,7 +473,7 @@
           <a:p>
             <a:fld id="{F5097797-44DE-48E0-BA19-F0A899A2AD84}" type="datetimeFigureOut">
               <a:rPr lang="en-GB" smtClean="0"/>
-              <a:t>07/10/2020</a:t>
+              <a:t>31/01/2022</a:t>
             </a:fld>
             <a:endParaRPr lang="en-GB"/>
           </a:p>
@@ -680,7 +683,7 @@
           <a:p>
             <a:fld id="{F5097797-44DE-48E0-BA19-F0A899A2AD84}" type="datetimeFigureOut">
               <a:rPr lang="en-GB" smtClean="0"/>
-              <a:t>07/10/2020</a:t>
+              <a:t>31/01/2022</a:t>
             </a:fld>
             <a:endParaRPr lang="en-GB"/>
           </a:p>
@@ -880,7 +883,7 @@
           <a:p>
             <a:fld id="{F5097797-44DE-48E0-BA19-F0A899A2AD84}" type="datetimeFigureOut">
               <a:rPr lang="en-GB" smtClean="0"/>
-              <a:t>07/10/2020</a:t>
+              <a:t>31/01/2022</a:t>
             </a:fld>
             <a:endParaRPr lang="en-GB"/>
           </a:p>
@@ -1156,7 +1159,7 @@
           <a:p>
             <a:fld id="{F5097797-44DE-48E0-BA19-F0A899A2AD84}" type="datetimeFigureOut">
               <a:rPr lang="en-GB" smtClean="0"/>
-              <a:t>07/10/2020</a:t>
+              <a:t>31/01/2022</a:t>
             </a:fld>
             <a:endParaRPr lang="en-GB"/>
           </a:p>
@@ -1424,7 +1427,7 @@
           <a:p>
             <a:fld id="{F5097797-44DE-48E0-BA19-F0A899A2AD84}" type="datetimeFigureOut">
               <a:rPr lang="en-GB" smtClean="0"/>
-              <a:t>07/10/2020</a:t>
+              <a:t>31/01/2022</a:t>
             </a:fld>
             <a:endParaRPr lang="en-GB"/>
           </a:p>
@@ -1839,7 +1842,7 @@
           <a:p>
             <a:fld id="{F5097797-44DE-48E0-BA19-F0A899A2AD84}" type="datetimeFigureOut">
               <a:rPr lang="en-GB" smtClean="0"/>
-              <a:t>07/10/2020</a:t>
+              <a:t>31/01/2022</a:t>
             </a:fld>
             <a:endParaRPr lang="en-GB"/>
           </a:p>
@@ -1981,7 +1984,7 @@
           <a:p>
             <a:fld id="{F5097797-44DE-48E0-BA19-F0A899A2AD84}" type="datetimeFigureOut">
               <a:rPr lang="en-GB" smtClean="0"/>
-              <a:t>07/10/2020</a:t>
+              <a:t>31/01/2022</a:t>
             </a:fld>
             <a:endParaRPr lang="en-GB"/>
           </a:p>
@@ -2094,7 +2097,7 @@
           <a:p>
             <a:fld id="{F5097797-44DE-48E0-BA19-F0A899A2AD84}" type="datetimeFigureOut">
               <a:rPr lang="en-GB" smtClean="0"/>
-              <a:t>07/10/2020</a:t>
+              <a:t>31/01/2022</a:t>
             </a:fld>
             <a:endParaRPr lang="en-GB"/>
           </a:p>
@@ -2407,7 +2410,7 @@
           <a:p>
             <a:fld id="{F5097797-44DE-48E0-BA19-F0A899A2AD84}" type="datetimeFigureOut">
               <a:rPr lang="en-GB" smtClean="0"/>
-              <a:t>07/10/2020</a:t>
+              <a:t>31/01/2022</a:t>
             </a:fld>
             <a:endParaRPr lang="en-GB"/>
           </a:p>
@@ -2696,7 +2699,7 @@
           <a:p>
             <a:fld id="{F5097797-44DE-48E0-BA19-F0A899A2AD84}" type="datetimeFigureOut">
               <a:rPr lang="en-GB" smtClean="0"/>
-              <a:t>07/10/2020</a:t>
+              <a:t>31/01/2022</a:t>
             </a:fld>
             <a:endParaRPr lang="en-GB"/>
           </a:p>
@@ -2939,7 +2942,7 @@
           <a:p>
             <a:fld id="{F5097797-44DE-48E0-BA19-F0A899A2AD84}" type="datetimeFigureOut">
               <a:rPr lang="en-GB" smtClean="0"/>
-              <a:t>07/10/2020</a:t>
+              <a:t>31/01/2022</a:t>
             </a:fld>
             <a:endParaRPr lang="en-GB"/>
           </a:p>
@@ -3664,6 +3667,768 @@
     <p:extLst>
       <p:ext uri="{BB962C8B-B14F-4D97-AF65-F5344CB8AC3E}">
         <p14:creationId xmlns:p14="http://schemas.microsoft.com/office/powerpoint/2010/main" val="367643760"/>
+      </p:ext>
+    </p:extLst>
+  </p:cSld>
+  <p:clrMapOvr>
+    <a:masterClrMapping/>
+  </p:clrMapOvr>
+</p:sld>
+</file>
+
+<file path=ppt/slides/slide11.xml><?xml version="1.0" encoding="utf-8"?>
+<p:sld xmlns:a="http://schemas.openxmlformats.org/drawingml/2006/main" xmlns:r="http://schemas.openxmlformats.org/officeDocument/2006/relationships" xmlns:p="http://schemas.openxmlformats.org/presentationml/2006/main">
+  <p:cSld>
+    <p:spTree>
+      <p:nvGrpSpPr>
+        <p:cNvPr id="1" name=""/>
+        <p:cNvGrpSpPr/>
+        <p:nvPr/>
+      </p:nvGrpSpPr>
+      <p:grpSpPr>
+        <a:xfrm>
+          <a:off x="0" y="0"/>
+          <a:ext cx="0" cy="0"/>
+          <a:chOff x="0" y="0"/>
+          <a:chExt cx="0" cy="0"/>
+        </a:xfrm>
+      </p:grpSpPr>
+      <p:grpSp>
+        <p:nvGrpSpPr>
+          <p:cNvPr id="35" name="Group 34">
+            <a:extLst>
+              <a:ext uri="{FF2B5EF4-FFF2-40B4-BE49-F238E27FC236}">
+                <a16:creationId xmlns:a16="http://schemas.microsoft.com/office/drawing/2014/main" id="{94242E99-58A1-4CD5-AB0D-DBC682D7DB6F}"/>
+              </a:ext>
+            </a:extLst>
+          </p:cNvPr>
+          <p:cNvGrpSpPr/>
+          <p:nvPr/>
+        </p:nvGrpSpPr>
+        <p:grpSpPr>
+          <a:xfrm>
+            <a:off x="538790" y="1083412"/>
+            <a:ext cx="2411320" cy="2657231"/>
+            <a:chOff x="541687" y="1141212"/>
+            <a:chExt cx="2411320" cy="2657231"/>
+          </a:xfrm>
+        </p:grpSpPr>
+        <p:sp>
+          <p:nvSpPr>
+            <p:cNvPr id="4" name="Rectangle 3">
+              <a:extLst>
+                <a:ext uri="{FF2B5EF4-FFF2-40B4-BE49-F238E27FC236}">
+                  <a16:creationId xmlns:a16="http://schemas.microsoft.com/office/drawing/2014/main" id="{AF5FEF6A-DE86-4427-A8E3-43CE66449BCD}"/>
+                </a:ext>
+              </a:extLst>
+            </p:cNvPr>
+            <p:cNvSpPr/>
+            <p:nvPr/>
+          </p:nvSpPr>
+          <p:spPr>
+            <a:xfrm>
+              <a:off x="541687" y="1141212"/>
+              <a:ext cx="2029515" cy="2657231"/>
+            </a:xfrm>
+            <a:prstGeom prst="rect">
+              <a:avLst/>
+            </a:prstGeom>
+            <a:solidFill>
+              <a:schemeClr val="bg1"/>
+            </a:solidFill>
+            <a:ln w="762000">
+              <a:solidFill>
+                <a:srgbClr val="C00000"/>
+              </a:solidFill>
+            </a:ln>
+          </p:spPr>
+          <p:style>
+            <a:lnRef idx="2">
+              <a:schemeClr val="accent1">
+                <a:shade val="50000"/>
+              </a:schemeClr>
+            </a:lnRef>
+            <a:fillRef idx="1">
+              <a:schemeClr val="accent1"/>
+            </a:fillRef>
+            <a:effectRef idx="0">
+              <a:schemeClr val="accent1"/>
+            </a:effectRef>
+            <a:fontRef idx="minor">
+              <a:schemeClr val="lt1"/>
+            </a:fontRef>
+          </p:style>
+          <p:txBody>
+            <a:bodyPr rtlCol="0" anchor="ctr"/>
+            <a:lstStyle/>
+            <a:p>
+              <a:pPr algn="ctr"/>
+              <a:endParaRPr lang="en-GB" dirty="0"/>
+            </a:p>
+          </p:txBody>
+        </p:sp>
+        <p:sp>
+          <p:nvSpPr>
+            <p:cNvPr id="5" name="Rectangle 4">
+              <a:extLst>
+                <a:ext uri="{FF2B5EF4-FFF2-40B4-BE49-F238E27FC236}">
+                  <a16:creationId xmlns:a16="http://schemas.microsoft.com/office/drawing/2014/main" id="{98C687BB-4CBF-4D49-9B17-7B426655BEB5}"/>
+                </a:ext>
+              </a:extLst>
+            </p:cNvPr>
+            <p:cNvSpPr/>
+            <p:nvPr/>
+          </p:nvSpPr>
+          <p:spPr>
+            <a:xfrm>
+              <a:off x="2144379" y="1523638"/>
+              <a:ext cx="808628" cy="1008000"/>
+            </a:xfrm>
+            <a:prstGeom prst="rect">
+              <a:avLst/>
+            </a:prstGeom>
+            <a:solidFill>
+              <a:schemeClr val="bg1"/>
+            </a:solidFill>
+            <a:ln>
+              <a:noFill/>
+            </a:ln>
+          </p:spPr>
+          <p:style>
+            <a:lnRef idx="2">
+              <a:schemeClr val="accent1">
+                <a:shade val="50000"/>
+              </a:schemeClr>
+            </a:lnRef>
+            <a:fillRef idx="1">
+              <a:schemeClr val="accent1"/>
+            </a:fillRef>
+            <a:effectRef idx="0">
+              <a:schemeClr val="accent1"/>
+            </a:effectRef>
+            <a:fontRef idx="minor">
+              <a:schemeClr val="lt1"/>
+            </a:fontRef>
+          </p:style>
+          <p:txBody>
+            <a:bodyPr rtlCol="0" anchor="ctr"/>
+            <a:lstStyle/>
+            <a:p>
+              <a:pPr algn="ctr"/>
+              <a:endParaRPr lang="en-GB"/>
+            </a:p>
+          </p:txBody>
+        </p:sp>
+      </p:grpSp>
+      <p:sp>
+        <p:nvSpPr>
+          <p:cNvPr id="13" name="Rectangle 12">
+            <a:extLst>
+              <a:ext uri="{FF2B5EF4-FFF2-40B4-BE49-F238E27FC236}">
+                <a16:creationId xmlns:a16="http://schemas.microsoft.com/office/drawing/2014/main" id="{0AF6203C-18D0-4F5C-9501-8F53F2877E30}"/>
+              </a:ext>
+            </a:extLst>
+          </p:cNvPr>
+          <p:cNvSpPr/>
+          <p:nvPr/>
+        </p:nvSpPr>
+        <p:spPr>
+          <a:xfrm rot="10800000">
+            <a:off x="3523818" y="1083411"/>
+            <a:ext cx="1985107" cy="2657231"/>
+          </a:xfrm>
+          <a:prstGeom prst="rect">
+            <a:avLst/>
+          </a:prstGeom>
+          <a:noFill/>
+          <a:ln w="762000">
+            <a:solidFill>
+              <a:srgbClr val="C00000"/>
+            </a:solidFill>
+          </a:ln>
+        </p:spPr>
+        <p:style>
+          <a:lnRef idx="2">
+            <a:schemeClr val="accent1">
+              <a:shade val="50000"/>
+            </a:schemeClr>
+          </a:lnRef>
+          <a:fillRef idx="1">
+            <a:schemeClr val="accent1"/>
+          </a:fillRef>
+          <a:effectRef idx="0">
+            <a:schemeClr val="accent1"/>
+          </a:effectRef>
+          <a:fontRef idx="minor">
+            <a:schemeClr val="lt1"/>
+          </a:fontRef>
+        </p:style>
+        <p:txBody>
+          <a:bodyPr rtlCol="0" anchor="ctr"/>
+          <a:lstStyle/>
+          <a:p>
+            <a:pPr algn="ctr"/>
+            <a:endParaRPr lang="en-GB"/>
+          </a:p>
+        </p:txBody>
+      </p:sp>
+      <p:sp>
+        <p:nvSpPr>
+          <p:cNvPr id="14" name="Rectangle 13">
+            <a:extLst>
+              <a:ext uri="{FF2B5EF4-FFF2-40B4-BE49-F238E27FC236}">
+                <a16:creationId xmlns:a16="http://schemas.microsoft.com/office/drawing/2014/main" id="{9D7C4B77-42B8-4FAB-B63E-B9264806E6F4}"/>
+              </a:ext>
+            </a:extLst>
+          </p:cNvPr>
+          <p:cNvSpPr/>
+          <p:nvPr/>
+        </p:nvSpPr>
+        <p:spPr>
+          <a:xfrm rot="10800000">
+            <a:off x="3141347" y="2353188"/>
+            <a:ext cx="768752" cy="1008000"/>
+          </a:xfrm>
+          <a:prstGeom prst="rect">
+            <a:avLst/>
+          </a:prstGeom>
+          <a:solidFill>
+            <a:schemeClr val="bg1"/>
+          </a:solidFill>
+          <a:ln>
+            <a:noFill/>
+          </a:ln>
+        </p:spPr>
+        <p:style>
+          <a:lnRef idx="2">
+            <a:schemeClr val="accent1">
+              <a:shade val="50000"/>
+            </a:schemeClr>
+          </a:lnRef>
+          <a:fillRef idx="1">
+            <a:schemeClr val="accent1"/>
+          </a:fillRef>
+          <a:effectRef idx="0">
+            <a:schemeClr val="accent1"/>
+          </a:effectRef>
+          <a:fontRef idx="minor">
+            <a:schemeClr val="lt1"/>
+          </a:fontRef>
+        </p:style>
+        <p:txBody>
+          <a:bodyPr rtlCol="0" anchor="ctr"/>
+          <a:lstStyle/>
+          <a:p>
+            <a:pPr algn="ctr"/>
+            <a:endParaRPr lang="en-GB"/>
+          </a:p>
+        </p:txBody>
+      </p:sp>
+      <p:sp>
+        <p:nvSpPr>
+          <p:cNvPr id="17" name="Rectangle 16">
+            <a:extLst>
+              <a:ext uri="{FF2B5EF4-FFF2-40B4-BE49-F238E27FC236}">
+                <a16:creationId xmlns:a16="http://schemas.microsoft.com/office/drawing/2014/main" id="{A86ADAA0-3A95-4485-A1D3-D30AD14C5B99}"/>
+              </a:ext>
+            </a:extLst>
+          </p:cNvPr>
+          <p:cNvSpPr/>
+          <p:nvPr/>
+        </p:nvSpPr>
+        <p:spPr>
+          <a:xfrm rot="10800000">
+            <a:off x="6518300" y="1141211"/>
+            <a:ext cx="1985107" cy="2657231"/>
+          </a:xfrm>
+          <a:prstGeom prst="rect">
+            <a:avLst/>
+          </a:prstGeom>
+          <a:noFill/>
+          <a:ln w="762000">
+            <a:solidFill>
+              <a:srgbClr val="C00000"/>
+            </a:solidFill>
+          </a:ln>
+        </p:spPr>
+        <p:style>
+          <a:lnRef idx="2">
+            <a:schemeClr val="accent1">
+              <a:shade val="50000"/>
+            </a:schemeClr>
+          </a:lnRef>
+          <a:fillRef idx="1">
+            <a:schemeClr val="accent1"/>
+          </a:fillRef>
+          <a:effectRef idx="0">
+            <a:schemeClr val="accent1"/>
+          </a:effectRef>
+          <a:fontRef idx="minor">
+            <a:schemeClr val="lt1"/>
+          </a:fontRef>
+        </p:style>
+        <p:txBody>
+          <a:bodyPr rtlCol="0" anchor="ctr"/>
+          <a:lstStyle/>
+          <a:p>
+            <a:pPr algn="ctr"/>
+            <a:endParaRPr lang="en-GB"/>
+          </a:p>
+        </p:txBody>
+      </p:sp>
+      <p:sp>
+        <p:nvSpPr>
+          <p:cNvPr id="18" name="Rectangle 17">
+            <a:extLst>
+              <a:ext uri="{FF2B5EF4-FFF2-40B4-BE49-F238E27FC236}">
+                <a16:creationId xmlns:a16="http://schemas.microsoft.com/office/drawing/2014/main" id="{627F9997-7C80-4687-B3D3-E2FB32DB26A4}"/>
+              </a:ext>
+            </a:extLst>
+          </p:cNvPr>
+          <p:cNvSpPr/>
+          <p:nvPr/>
+        </p:nvSpPr>
+        <p:spPr>
+          <a:xfrm rot="10800000">
+            <a:off x="8119109" y="2410122"/>
+            <a:ext cx="766103" cy="1008000"/>
+          </a:xfrm>
+          <a:prstGeom prst="rect">
+            <a:avLst/>
+          </a:prstGeom>
+          <a:solidFill>
+            <a:schemeClr val="bg1"/>
+          </a:solidFill>
+          <a:ln>
+            <a:noFill/>
+          </a:ln>
+        </p:spPr>
+        <p:style>
+          <a:lnRef idx="2">
+            <a:schemeClr val="accent1">
+              <a:shade val="50000"/>
+            </a:schemeClr>
+          </a:lnRef>
+          <a:fillRef idx="1">
+            <a:schemeClr val="accent1"/>
+          </a:fillRef>
+          <a:effectRef idx="0">
+            <a:schemeClr val="accent1"/>
+          </a:effectRef>
+          <a:fontRef idx="minor">
+            <a:schemeClr val="lt1"/>
+          </a:fontRef>
+        </p:style>
+        <p:txBody>
+          <a:bodyPr rtlCol="0" anchor="ctr"/>
+          <a:lstStyle/>
+          <a:p>
+            <a:pPr algn="ctr"/>
+            <a:endParaRPr lang="en-GB"/>
+          </a:p>
+        </p:txBody>
+      </p:sp>
+      <p:sp>
+        <p:nvSpPr>
+          <p:cNvPr id="19" name="Rectangle 18">
+            <a:extLst>
+              <a:ext uri="{FF2B5EF4-FFF2-40B4-BE49-F238E27FC236}">
+                <a16:creationId xmlns:a16="http://schemas.microsoft.com/office/drawing/2014/main" id="{7DD09052-541E-44A3-8562-2EDB13A46CE8}"/>
+              </a:ext>
+            </a:extLst>
+          </p:cNvPr>
+          <p:cNvSpPr/>
+          <p:nvPr/>
+        </p:nvSpPr>
+        <p:spPr>
+          <a:xfrm rot="10800000">
+            <a:off x="9571129" y="1141211"/>
+            <a:ext cx="1985107" cy="2657231"/>
+          </a:xfrm>
+          <a:prstGeom prst="rect">
+            <a:avLst/>
+          </a:prstGeom>
+          <a:noFill/>
+          <a:ln w="762000">
+            <a:solidFill>
+              <a:srgbClr val="C00000"/>
+            </a:solidFill>
+          </a:ln>
+        </p:spPr>
+        <p:style>
+          <a:lnRef idx="2">
+            <a:schemeClr val="accent1">
+              <a:shade val="50000"/>
+            </a:schemeClr>
+          </a:lnRef>
+          <a:fillRef idx="1">
+            <a:schemeClr val="accent1"/>
+          </a:fillRef>
+          <a:effectRef idx="0">
+            <a:schemeClr val="accent1"/>
+          </a:effectRef>
+          <a:fontRef idx="minor">
+            <a:schemeClr val="lt1"/>
+          </a:fontRef>
+        </p:style>
+        <p:txBody>
+          <a:bodyPr rtlCol="0" anchor="ctr"/>
+          <a:lstStyle/>
+          <a:p>
+            <a:pPr algn="ctr"/>
+            <a:endParaRPr lang="en-GB"/>
+          </a:p>
+        </p:txBody>
+      </p:sp>
+      <p:sp>
+        <p:nvSpPr>
+          <p:cNvPr id="20" name="Rectangle 19">
+            <a:extLst>
+              <a:ext uri="{FF2B5EF4-FFF2-40B4-BE49-F238E27FC236}">
+                <a16:creationId xmlns:a16="http://schemas.microsoft.com/office/drawing/2014/main" id="{48D90BDD-0990-42C5-98E7-80311B39AB7E}"/>
+              </a:ext>
+            </a:extLst>
+          </p:cNvPr>
+          <p:cNvSpPr/>
+          <p:nvPr/>
+        </p:nvSpPr>
+        <p:spPr>
+          <a:xfrm rot="10800000">
+            <a:off x="9189324" y="1525543"/>
+            <a:ext cx="763610" cy="1008000"/>
+          </a:xfrm>
+          <a:prstGeom prst="rect">
+            <a:avLst/>
+          </a:prstGeom>
+          <a:solidFill>
+            <a:schemeClr val="bg1"/>
+          </a:solidFill>
+          <a:ln>
+            <a:noFill/>
+          </a:ln>
+        </p:spPr>
+        <p:style>
+          <a:lnRef idx="2">
+            <a:schemeClr val="accent1">
+              <a:shade val="50000"/>
+            </a:schemeClr>
+          </a:lnRef>
+          <a:fillRef idx="1">
+            <a:schemeClr val="accent1"/>
+          </a:fillRef>
+          <a:effectRef idx="0">
+            <a:schemeClr val="accent1"/>
+          </a:effectRef>
+          <a:fontRef idx="minor">
+            <a:schemeClr val="lt1"/>
+          </a:fontRef>
+        </p:style>
+        <p:txBody>
+          <a:bodyPr rtlCol="0" anchor="ctr"/>
+          <a:lstStyle/>
+          <a:p>
+            <a:pPr algn="ctr"/>
+            <a:endParaRPr lang="en-GB"/>
+          </a:p>
+        </p:txBody>
+      </p:sp>
+    </p:spTree>
+    <p:extLst>
+      <p:ext uri="{BB962C8B-B14F-4D97-AF65-F5344CB8AC3E}">
+        <p14:creationId xmlns:p14="http://schemas.microsoft.com/office/powerpoint/2010/main" val="3486910222"/>
+      </p:ext>
+    </p:extLst>
+  </p:cSld>
+  <p:clrMapOvr>
+    <a:masterClrMapping/>
+  </p:clrMapOvr>
+</p:sld>
+</file>
+
+<file path=ppt/slides/slide12.xml><?xml version="1.0" encoding="utf-8"?>
+<p:sld xmlns:a="http://schemas.openxmlformats.org/drawingml/2006/main" xmlns:r="http://schemas.openxmlformats.org/officeDocument/2006/relationships" xmlns:p="http://schemas.openxmlformats.org/presentationml/2006/main">
+  <p:cSld>
+    <p:spTree>
+      <p:nvGrpSpPr>
+        <p:cNvPr id="1" name=""/>
+        <p:cNvGrpSpPr/>
+        <p:nvPr/>
+      </p:nvGrpSpPr>
+      <p:grpSpPr>
+        <a:xfrm>
+          <a:off x="0" y="0"/>
+          <a:ext cx="0" cy="0"/>
+          <a:chOff x="0" y="0"/>
+          <a:chExt cx="0" cy="0"/>
+        </a:xfrm>
+      </p:grpSpPr>
+      <p:sp>
+        <p:nvSpPr>
+          <p:cNvPr id="4" name="Rectangle 3">
+            <a:extLst>
+              <a:ext uri="{FF2B5EF4-FFF2-40B4-BE49-F238E27FC236}">
+                <a16:creationId xmlns:a16="http://schemas.microsoft.com/office/drawing/2014/main" id="{AF5FEF6A-DE86-4427-A8E3-43CE66449BCD}"/>
+              </a:ext>
+            </a:extLst>
+          </p:cNvPr>
+          <p:cNvSpPr/>
+          <p:nvPr/>
+        </p:nvSpPr>
+        <p:spPr>
+          <a:xfrm>
+            <a:off x="1742750" y="1021080"/>
+            <a:ext cx="2029515" cy="2681463"/>
+          </a:xfrm>
+          <a:prstGeom prst="rect">
+            <a:avLst/>
+          </a:prstGeom>
+          <a:solidFill>
+            <a:schemeClr val="bg1"/>
+          </a:solidFill>
+          <a:ln w="762000">
+            <a:solidFill>
+              <a:srgbClr val="C00000"/>
+            </a:solidFill>
+          </a:ln>
+        </p:spPr>
+        <p:style>
+          <a:lnRef idx="2">
+            <a:schemeClr val="accent1">
+              <a:shade val="50000"/>
+            </a:schemeClr>
+          </a:lnRef>
+          <a:fillRef idx="1">
+            <a:schemeClr val="accent1"/>
+          </a:fillRef>
+          <a:effectRef idx="0">
+            <a:schemeClr val="accent1"/>
+          </a:effectRef>
+          <a:fontRef idx="minor">
+            <a:schemeClr val="lt1"/>
+          </a:fontRef>
+        </p:style>
+        <p:txBody>
+          <a:bodyPr rtlCol="0" anchor="ctr"/>
+          <a:lstStyle/>
+          <a:p>
+            <a:pPr algn="ctr"/>
+            <a:endParaRPr lang="en-GB" dirty="0"/>
+          </a:p>
+        </p:txBody>
+      </p:sp>
+      <p:sp>
+        <p:nvSpPr>
+          <p:cNvPr id="5" name="Rectangle 4">
+            <a:extLst>
+              <a:ext uri="{FF2B5EF4-FFF2-40B4-BE49-F238E27FC236}">
+                <a16:creationId xmlns:a16="http://schemas.microsoft.com/office/drawing/2014/main" id="{98C687BB-4CBF-4D49-9B17-7B426655BEB5}"/>
+              </a:ext>
+            </a:extLst>
+          </p:cNvPr>
+          <p:cNvSpPr/>
+          <p:nvPr/>
+        </p:nvSpPr>
+        <p:spPr>
+          <a:xfrm>
+            <a:off x="3351538" y="1407374"/>
+            <a:ext cx="808628" cy="1017192"/>
+          </a:xfrm>
+          <a:prstGeom prst="rect">
+            <a:avLst/>
+          </a:prstGeom>
+          <a:solidFill>
+            <a:schemeClr val="bg1"/>
+          </a:solidFill>
+          <a:ln>
+            <a:noFill/>
+          </a:ln>
+        </p:spPr>
+        <p:style>
+          <a:lnRef idx="2">
+            <a:schemeClr val="accent1">
+              <a:shade val="50000"/>
+            </a:schemeClr>
+          </a:lnRef>
+          <a:fillRef idx="1">
+            <a:schemeClr val="accent1"/>
+          </a:fillRef>
+          <a:effectRef idx="0">
+            <a:schemeClr val="accent1"/>
+          </a:effectRef>
+          <a:fontRef idx="minor">
+            <a:schemeClr val="lt1"/>
+          </a:fontRef>
+        </p:style>
+        <p:txBody>
+          <a:bodyPr rtlCol="0" anchor="ctr"/>
+          <a:lstStyle/>
+          <a:p>
+            <a:pPr algn="ctr"/>
+            <a:endParaRPr lang="en-GB"/>
+          </a:p>
+        </p:txBody>
+      </p:sp>
+    </p:spTree>
+    <p:extLst>
+      <p:ext uri="{BB962C8B-B14F-4D97-AF65-F5344CB8AC3E}">
+        <p14:creationId xmlns:p14="http://schemas.microsoft.com/office/powerpoint/2010/main" val="4105721623"/>
+      </p:ext>
+    </p:extLst>
+  </p:cSld>
+  <p:clrMapOvr>
+    <a:masterClrMapping/>
+  </p:clrMapOvr>
+</p:sld>
+</file>
+
+<file path=ppt/slides/slide13.xml><?xml version="1.0" encoding="utf-8"?>
+<p:sld xmlns:a="http://schemas.openxmlformats.org/drawingml/2006/main" xmlns:r="http://schemas.openxmlformats.org/officeDocument/2006/relationships" xmlns:p="http://schemas.openxmlformats.org/presentationml/2006/main">
+  <p:cSld>
+    <p:spTree>
+      <p:nvGrpSpPr>
+        <p:cNvPr id="1" name=""/>
+        <p:cNvGrpSpPr/>
+        <p:nvPr/>
+      </p:nvGrpSpPr>
+      <p:grpSpPr>
+        <a:xfrm>
+          <a:off x="0" y="0"/>
+          <a:ext cx="0" cy="0"/>
+          <a:chOff x="0" y="0"/>
+          <a:chExt cx="0" cy="0"/>
+        </a:xfrm>
+      </p:grpSpPr>
+      <p:grpSp>
+        <p:nvGrpSpPr>
+          <p:cNvPr id="6" name="Group 5">
+            <a:extLst>
+              <a:ext uri="{FF2B5EF4-FFF2-40B4-BE49-F238E27FC236}">
+                <a16:creationId xmlns:a16="http://schemas.microsoft.com/office/drawing/2014/main" id="{A37A4844-C514-411F-B41D-CC83A2C3167B}"/>
+              </a:ext>
+            </a:extLst>
+          </p:cNvPr>
+          <p:cNvGrpSpPr/>
+          <p:nvPr/>
+        </p:nvGrpSpPr>
+        <p:grpSpPr>
+          <a:xfrm>
+            <a:off x="2023826" y="1180123"/>
+            <a:ext cx="2235913" cy="2657231"/>
+            <a:chOff x="2023826" y="1180123"/>
+            <a:chExt cx="2235913" cy="2657231"/>
+          </a:xfrm>
+        </p:grpSpPr>
+        <p:sp>
+          <p:nvSpPr>
+            <p:cNvPr id="4" name="Rectangle 3">
+              <a:extLst>
+                <a:ext uri="{FF2B5EF4-FFF2-40B4-BE49-F238E27FC236}">
+                  <a16:creationId xmlns:a16="http://schemas.microsoft.com/office/drawing/2014/main" id="{AF5FEF6A-DE86-4427-A8E3-43CE66449BCD}"/>
+                </a:ext>
+              </a:extLst>
+            </p:cNvPr>
+            <p:cNvSpPr/>
+            <p:nvPr/>
+          </p:nvSpPr>
+          <p:spPr>
+            <a:xfrm>
+              <a:off x="2149231" y="1180123"/>
+              <a:ext cx="1985107" cy="2657231"/>
+            </a:xfrm>
+            <a:prstGeom prst="rect">
+              <a:avLst/>
+            </a:prstGeom>
+            <a:solidFill>
+              <a:schemeClr val="bg1"/>
+            </a:solidFill>
+            <a:ln w="762000">
+              <a:solidFill>
+                <a:srgbClr val="C00000"/>
+              </a:solidFill>
+            </a:ln>
+          </p:spPr>
+          <p:style>
+            <a:lnRef idx="2">
+              <a:schemeClr val="accent1">
+                <a:shade val="50000"/>
+              </a:schemeClr>
+            </a:lnRef>
+            <a:fillRef idx="1">
+              <a:schemeClr val="accent1"/>
+            </a:fillRef>
+            <a:effectRef idx="0">
+              <a:schemeClr val="accent1"/>
+            </a:effectRef>
+            <a:fontRef idx="minor">
+              <a:schemeClr val="lt1"/>
+            </a:fontRef>
+          </p:style>
+          <p:txBody>
+            <a:bodyPr rtlCol="0" anchor="ctr"/>
+            <a:lstStyle/>
+            <a:p>
+              <a:pPr algn="ctr"/>
+              <a:endParaRPr lang="en-GB"/>
+            </a:p>
+          </p:txBody>
+        </p:sp>
+        <p:sp>
+          <p:nvSpPr>
+            <p:cNvPr id="5" name="Rectangle 4">
+              <a:extLst>
+                <a:ext uri="{FF2B5EF4-FFF2-40B4-BE49-F238E27FC236}">
+                  <a16:creationId xmlns:a16="http://schemas.microsoft.com/office/drawing/2014/main" id="{98C687BB-4CBF-4D49-9B17-7B426655BEB5}"/>
+                </a:ext>
+              </a:extLst>
+            </p:cNvPr>
+            <p:cNvSpPr/>
+            <p:nvPr/>
+          </p:nvSpPr>
+          <p:spPr>
+            <a:xfrm rot="5400000">
+              <a:off x="2763783" y="1390782"/>
+              <a:ext cx="756000" cy="2235913"/>
+            </a:xfrm>
+            <a:prstGeom prst="rect">
+              <a:avLst/>
+            </a:prstGeom>
+            <a:solidFill>
+              <a:srgbClr val="C00000"/>
+            </a:solidFill>
+            <a:ln>
+              <a:noFill/>
+            </a:ln>
+          </p:spPr>
+          <p:style>
+            <a:lnRef idx="2">
+              <a:schemeClr val="accent1">
+                <a:shade val="50000"/>
+              </a:schemeClr>
+            </a:lnRef>
+            <a:fillRef idx="1">
+              <a:schemeClr val="accent1"/>
+            </a:fillRef>
+            <a:effectRef idx="0">
+              <a:schemeClr val="accent1"/>
+            </a:effectRef>
+            <a:fontRef idx="minor">
+              <a:schemeClr val="lt1"/>
+            </a:fontRef>
+          </p:style>
+          <p:txBody>
+            <a:bodyPr rtlCol="0" anchor="ctr"/>
+            <a:lstStyle/>
+            <a:p>
+              <a:pPr algn="ctr"/>
+              <a:endParaRPr lang="en-GB"/>
+            </a:p>
+          </p:txBody>
+        </p:sp>
+      </p:grpSp>
+    </p:spTree>
+    <p:extLst>
+      <p:ext uri="{BB962C8B-B14F-4D97-AF65-F5344CB8AC3E}">
+        <p14:creationId xmlns:p14="http://schemas.microsoft.com/office/powerpoint/2010/main" val="1982041534"/>
       </p:ext>
     </p:extLst>
   </p:cSld>

</xml_diff>